<commit_message>
Spelling correction in PPT
Fixed spelling error in PPT
</commit_message>
<xml_diff>
--- a/2017 Messy Data.pptx
+++ b/2017 Messy Data.pptx
@@ -7914,7 +7914,7 @@
           <a:p>
             <a:r>
               <a:rPr lang="en-US" dirty="0"/>
-              <a:t>Take it once piece (or character) at a time.</a:t>
+              <a:t>Take it one piece (or character) at a time.</a:t>
             </a:r>
           </a:p>
           <a:p>
@@ -7938,7 +7938,15 @@
           <a:p>
             <a:r>
               <a:rPr lang="en-US" dirty="0"/>
-              <a:t>Take it once piece (or character) at a time.</a:t>
+              <a:t>Take </a:t>
+            </a:r>
+            <a:r>
+              <a:rPr lang="en-US"/>
+              <a:t>it one </a:t>
+            </a:r>
+            <a:r>
+              <a:rPr lang="en-US" dirty="0"/>
+              <a:t>piece (or character) at a time.</a:t>
             </a:r>
           </a:p>
           <a:p>
@@ -16350,9 +16358,6 @@
             </a:br>
             <a:r>
               <a:rPr lang="en-US" dirty="0" err="1">
-                <a:solidFill>
-                  <a:schemeClr val="accent3"/>
-                </a:solidFill>
                 <a:latin typeface="Consolas" panose="020B0609020204030204" pitchFamily="49" charset="0"/>
                 <a:cs typeface="Consolas" panose="020B0609020204030204" pitchFamily="49" charset="0"/>
               </a:rPr>
@@ -16360,18 +16365,12 @@
             </a:r>
             <a:br>
               <a:rPr lang="en-US" dirty="0">
-                <a:solidFill>
-                  <a:schemeClr val="accent3"/>
-                </a:solidFill>
                 <a:latin typeface="Consolas" panose="020B0609020204030204" pitchFamily="49" charset="0"/>
                 <a:cs typeface="Consolas" panose="020B0609020204030204" pitchFamily="49" charset="0"/>
               </a:rPr>
             </a:br>
             <a:r>
               <a:rPr lang="en-US" dirty="0">
-                <a:solidFill>
-                  <a:schemeClr val="accent3"/>
-                </a:solidFill>
                 <a:latin typeface="Consolas" panose="020B0609020204030204" pitchFamily="49" charset="0"/>
                 <a:cs typeface="Consolas" panose="020B0609020204030204" pitchFamily="49" charset="0"/>
               </a:rPr>
@@ -16379,18 +16378,12 @@
             </a:r>
             <a:br>
               <a:rPr lang="en-US" dirty="0">
-                <a:solidFill>
-                  <a:schemeClr val="accent3"/>
-                </a:solidFill>
                 <a:latin typeface="Consolas" panose="020B0609020204030204" pitchFamily="49" charset="0"/>
                 <a:cs typeface="Consolas" panose="020B0609020204030204" pitchFamily="49" charset="0"/>
               </a:rPr>
             </a:br>
             <a:r>
               <a:rPr lang="en-US" dirty="0">
-                <a:solidFill>
-                  <a:schemeClr val="accent3"/>
-                </a:solidFill>
                 <a:latin typeface="Consolas" panose="020B0609020204030204" pitchFamily="49" charset="0"/>
                 <a:cs typeface="Consolas" panose="020B0609020204030204" pitchFamily="49" charset="0"/>
               </a:rPr>
@@ -16398,18 +16391,12 @@
             </a:r>
             <a:br>
               <a:rPr lang="en-US" dirty="0">
-                <a:solidFill>
-                  <a:schemeClr val="accent3"/>
-                </a:solidFill>
                 <a:latin typeface="Consolas" panose="020B0609020204030204" pitchFamily="49" charset="0"/>
                 <a:cs typeface="Consolas" panose="020B0609020204030204" pitchFamily="49" charset="0"/>
               </a:rPr>
             </a:br>
             <a:r>
               <a:rPr lang="en-US" dirty="0">
-                <a:solidFill>
-                  <a:schemeClr val="accent3"/>
-                </a:solidFill>
                 <a:latin typeface="Consolas" panose="020B0609020204030204" pitchFamily="49" charset="0"/>
                 <a:cs typeface="Consolas" panose="020B0609020204030204" pitchFamily="49" charset="0"/>
               </a:rPr>

</xml_diff>